<commit_message>
added: custom graph transformer
</commit_message>
<xml_diff>
--- a/presentations/Využitie LLM pre analýzu právnych dokumentov.pptx
+++ b/presentations/Využitie LLM pre analýzu právnych dokumentov.pptx
@@ -5424,7 +5424,7 @@
         </p:nvSpPr>
         <p:spPr>
           <a:xfrm>
-            <a:off x="1230086" y="4714691"/>
+            <a:off x="314215" y="4578166"/>
             <a:ext cx="10515600" cy="2143309"/>
           </a:xfrm>
         </p:spPr>
@@ -5445,22 +5445,93 @@
               <a:buNone/>
             </a:pPr>
             <a:r>
-              <a:rPr lang="sk-SK" dirty="0"/>
+              <a:rPr lang="sk-SK" sz="1400" dirty="0"/>
               <a:t>Neo4j, </a:t>
             </a:r>
             <a:r>
-              <a:rPr lang="sk-SK" dirty="0" err="1"/>
+              <a:rPr lang="sk-SK" sz="1400" dirty="0" err="1"/>
               <a:t>LangChain</a:t>
             </a:r>
             <a:r>
-              <a:rPr lang="sk-SK" dirty="0"/>
+              <a:rPr lang="sk-SK" sz="1400" dirty="0"/>
               <a:t>, </a:t>
             </a:r>
             <a:r>
-              <a:rPr lang="sk-SK" dirty="0" err="1"/>
+              <a:rPr lang="sk-SK" sz="1400" dirty="0" err="1"/>
               <a:t>OpenAI</a:t>
             </a:r>
-            <a:endParaRPr lang="sk-SK" sz="2800" dirty="0"/>
+            <a:endParaRPr lang="sk-SK" sz="1400" dirty="0"/>
+          </a:p>
+          <a:p>
+            <a:pPr marL="0" indent="0">
+              <a:buNone/>
+            </a:pPr>
+            <a:r>
+              <a:rPr lang="sk-SK" sz="1100" i="1" dirty="0" err="1">
+                <a:solidFill>
+                  <a:schemeClr val="tx1">
+                    <a:lumMod val="75000"/>
+                    <a:lumOff val="25000"/>
+                  </a:schemeClr>
+                </a:solidFill>
+              </a:rPr>
+              <a:t>https</a:t>
+            </a:r>
+            <a:r>
+              <a:rPr lang="sk-SK" sz="1100" i="1" dirty="0">
+                <a:solidFill>
+                  <a:schemeClr val="tx1">
+                    <a:lumMod val="75000"/>
+                    <a:lumOff val="25000"/>
+                  </a:schemeClr>
+                </a:solidFill>
+              </a:rPr>
+              <a:t>://</a:t>
+            </a:r>
+            <a:r>
+              <a:rPr lang="sk-SK" sz="1100" i="1" dirty="0" err="1">
+                <a:solidFill>
+                  <a:schemeClr val="tx1">
+                    <a:lumMod val="75000"/>
+                    <a:lumOff val="25000"/>
+                  </a:schemeClr>
+                </a:solidFill>
+              </a:rPr>
+              <a:t>medium.com</a:t>
+            </a:r>
+            <a:r>
+              <a:rPr lang="sk-SK" sz="1100" i="1" dirty="0">
+                <a:solidFill>
+                  <a:schemeClr val="tx1">
+                    <a:lumMod val="75000"/>
+                    <a:lumOff val="25000"/>
+                  </a:schemeClr>
+                </a:solidFill>
+              </a:rPr>
+              <a:t>/@</a:t>
+            </a:r>
+            <a:r>
+              <a:rPr lang="sk-SK" sz="1100" i="1" dirty="0" err="1">
+                <a:solidFill>
+                  <a:schemeClr val="tx1">
+                    <a:lumMod val="75000"/>
+                    <a:lumOff val="25000"/>
+                  </a:schemeClr>
+                </a:solidFill>
+              </a:rPr>
+              <a:t>claudiubranzan</a:t>
+            </a:r>
+            <a:r>
+              <a:rPr lang="sk-SK" sz="1100" i="1" dirty="0">
+                <a:solidFill>
+                  <a:schemeClr val="tx1">
+                    <a:lumMod val="75000"/>
+                    <a:lumOff val="25000"/>
+                  </a:schemeClr>
+                </a:solidFill>
+              </a:rPr>
+              <a:t>/from-llms-to-knowledge-graphs-building-production-ready-graph-systems-in-2025-2b4aff1ec99a</a:t>
+            </a:r>
           </a:p>
         </p:txBody>
       </p:sp>
@@ -7224,6 +7295,15 @@
 </file>
 
 <file path=customXml/item1.xml><?xml version="1.0" encoding="utf-8"?>
+<?mso-contentType ?>
+<FormTemplates xmlns="http://schemas.microsoft.com/sharepoint/v3/contenttype/forms">
+  <Display>DocumentLibraryForm</Display>
+  <Edit>DocumentLibraryForm</Edit>
+  <New>DocumentLibraryForm</New>
+</FormTemplates>
+</file>
+
+<file path=customXml/item2.xml><?xml version="1.0" encoding="utf-8"?>
 <p:properties xmlns:p="http://schemas.microsoft.com/office/2006/metadata/properties" xmlns:xsi="http://www.w3.org/2001/XMLSchema-instance" xmlns:pc="http://schemas.microsoft.com/office/infopath/2007/PartnerControls">
   <documentManagement>
     <lcf76f155ced4ddcb4097134ff3c332f xmlns="d01b66bd-e699-4830-aac9-b18e744e07eb">
@@ -7232,15 +7312,6 @@
     <TaxCatchAll xmlns="790187d4-4294-4956-88ae-a0a46046ed0a" xsi:nil="true"/>
   </documentManagement>
 </p:properties>
-</file>
-
-<file path=customXml/item2.xml><?xml version="1.0" encoding="utf-8"?>
-<?mso-contentType ?>
-<FormTemplates xmlns="http://schemas.microsoft.com/sharepoint/v3/contenttype/forms">
-  <Display>DocumentLibraryForm</Display>
-  <Edit>DocumentLibraryForm</Edit>
-  <New>DocumentLibraryForm</New>
-</FormTemplates>
 </file>
 
 <file path=customXml/item3.xml><?xml version="1.0" encoding="utf-8"?>
@@ -7473,20 +7544,20 @@
 </file>
 
 <file path=customXml/itemProps1.xml><?xml version="1.0" encoding="utf-8"?>
+<ds:datastoreItem xmlns:ds="http://schemas.openxmlformats.org/officeDocument/2006/customXml" ds:itemID="{375C6E88-C769-48B0-91D3-77870C89206A}">
+  <ds:schemaRefs>
+    <ds:schemaRef ds:uri="http://schemas.microsoft.com/sharepoint/v3/contenttype/forms"/>
+  </ds:schemaRefs>
+</ds:datastoreItem>
+</file>
+
+<file path=customXml/itemProps2.xml><?xml version="1.0" encoding="utf-8"?>
 <ds:datastoreItem xmlns:ds="http://schemas.openxmlformats.org/officeDocument/2006/customXml" ds:itemID="{734999B7-1407-4E96-8E46-8443EF5F6F2E}">
   <ds:schemaRefs>
     <ds:schemaRef ds:uri="http://schemas.microsoft.com/office/2006/metadata/properties"/>
     <ds:schemaRef ds:uri="http://schemas.microsoft.com/office/infopath/2007/PartnerControls"/>
     <ds:schemaRef ds:uri="d01b66bd-e699-4830-aac9-b18e744e07eb"/>
     <ds:schemaRef ds:uri="790187d4-4294-4956-88ae-a0a46046ed0a"/>
-  </ds:schemaRefs>
-</ds:datastoreItem>
-</file>
-
-<file path=customXml/itemProps2.xml><?xml version="1.0" encoding="utf-8"?>
-<ds:datastoreItem xmlns:ds="http://schemas.openxmlformats.org/officeDocument/2006/customXml" ds:itemID="{375C6E88-C769-48B0-91D3-77870C89206A}">
-  <ds:schemaRefs>
-    <ds:schemaRef ds:uri="http://schemas.microsoft.com/sharepoint/v3/contenttype/forms"/>
   </ds:schemaRefs>
 </ds:datastoreItem>
 </file>

</xml_diff>